<commit_message>
small update to btree slide
</commit_message>
<xml_diff>
--- a/presentations/Lab02.pptx
+++ b/presentations/Lab02.pptx
@@ -365,7 +365,7 @@
           <a:p>
             <a:fld id="{2E6DE88F-1F85-4A27-9D34-D74A50E7B0DA}" type="slidenum">
               <a:rPr lang="en-US" smtClean="0"/>
-              <a:t>‹#›</a:t>
+              <a:t>‹Nr.›</a:t>
             </a:fld>
             <a:endParaRPr lang="en-US" dirty="0"/>
           </a:p>
@@ -702,7 +702,7 @@
             <a:fld id="{3A98EE3D-8CD1-4C3F-BD1C-C98C9596463C}" type="slidenum">
               <a:rPr lang="en-US" smtClean="0"/>
               <a:pPr/>
-              <a:t>‹#›</a:t>
+              <a:t>‹Nr.›</a:t>
             </a:fld>
             <a:endParaRPr lang="en-US" dirty="0"/>
           </a:p>
@@ -1006,7 +1006,7 @@
           <a:p>
             <a:fld id="{3A98EE3D-8CD1-4C3F-BD1C-C98C9596463C}" type="slidenum">
               <a:rPr lang="en-US" smtClean="0"/>
-              <a:t>‹#›</a:t>
+              <a:t>‹Nr.›</a:t>
             </a:fld>
             <a:endParaRPr lang="en-US" dirty="0"/>
           </a:p>
@@ -1200,7 +1200,7 @@
           <a:p>
             <a:fld id="{3A98EE3D-8CD1-4C3F-BD1C-C98C9596463C}" type="slidenum">
               <a:rPr lang="en-US" smtClean="0"/>
-              <a:t>‹#›</a:t>
+              <a:t>‹Nr.›</a:t>
             </a:fld>
             <a:endParaRPr lang="en-US" dirty="0"/>
           </a:p>
@@ -1463,7 +1463,7 @@
           <a:p>
             <a:fld id="{3A98EE3D-8CD1-4C3F-BD1C-C98C9596463C}" type="slidenum">
               <a:rPr lang="en-US" smtClean="0"/>
-              <a:t>‹#›</a:t>
+              <a:t>‹Nr.›</a:t>
             </a:fld>
             <a:endParaRPr lang="en-US" dirty="0"/>
           </a:p>
@@ -1899,7 +1899,7 @@
           <a:p>
             <a:fld id="{3A98EE3D-8CD1-4C3F-BD1C-C98C9596463C}" type="slidenum">
               <a:rPr lang="en-US" smtClean="0"/>
-              <a:t>‹#›</a:t>
+              <a:t>‹Nr.›</a:t>
             </a:fld>
             <a:endParaRPr lang="en-US" dirty="0"/>
           </a:p>
@@ -2436,7 +2436,7 @@
           <a:p>
             <a:fld id="{3A98EE3D-8CD1-4C3F-BD1C-C98C9596463C}" type="slidenum">
               <a:rPr lang="en-US" smtClean="0"/>
-              <a:t>‹#›</a:t>
+              <a:t>‹Nr.›</a:t>
             </a:fld>
             <a:endParaRPr lang="en-US" dirty="0"/>
           </a:p>
@@ -3318,7 +3318,7 @@
           <a:p>
             <a:fld id="{3A98EE3D-8CD1-4C3F-BD1C-C98C9596463C}" type="slidenum">
               <a:rPr lang="en-US" smtClean="0"/>
-              <a:t>‹#›</a:t>
+              <a:t>‹Nr.›</a:t>
             </a:fld>
             <a:endParaRPr lang="en-US" dirty="0"/>
           </a:p>
@@ -3488,7 +3488,7 @@
           <a:p>
             <a:fld id="{3A98EE3D-8CD1-4C3F-BD1C-C98C9596463C}" type="slidenum">
               <a:rPr lang="en-US" smtClean="0"/>
-              <a:t>‹#›</a:t>
+              <a:t>‹Nr.›</a:t>
             </a:fld>
             <a:endParaRPr lang="en-US" dirty="0"/>
           </a:p>
@@ -3733,7 +3733,7 @@
             <a:fld id="{3A98EE3D-8CD1-4C3F-BD1C-C98C9596463C}" type="slidenum">
               <a:rPr lang="en-US" smtClean="0"/>
               <a:pPr/>
-              <a:t>‹#›</a:t>
+              <a:t>‹Nr.›</a:t>
             </a:fld>
             <a:endParaRPr lang="en-US" dirty="0"/>
           </a:p>
@@ -3974,7 +3974,7 @@
           <a:p>
             <a:fld id="{3A98EE3D-8CD1-4C3F-BD1C-C98C9596463C}" type="slidenum">
               <a:rPr lang="en-US" smtClean="0"/>
-              <a:t>‹#›</a:t>
+              <a:t>‹Nr.›</a:t>
             </a:fld>
             <a:endParaRPr lang="en-US" dirty="0"/>
           </a:p>
@@ -4457,7 +4457,7 @@
           <a:p>
             <a:fld id="{3A98EE3D-8CD1-4C3F-BD1C-C98C9596463C}" type="slidenum">
               <a:rPr lang="en-US" smtClean="0"/>
-              <a:t>‹#›</a:t>
+              <a:t>‹Nr.›</a:t>
             </a:fld>
             <a:endParaRPr lang="en-US" dirty="0"/>
           </a:p>
@@ -4575,7 +4575,7 @@
           <a:p>
             <a:fld id="{3A98EE3D-8CD1-4C3F-BD1C-C98C9596463C}" type="slidenum">
               <a:rPr lang="en-US" smtClean="0"/>
-              <a:t>‹#›</a:t>
+              <a:t>‹Nr.›</a:t>
             </a:fld>
             <a:endParaRPr lang="en-US" dirty="0"/>
           </a:p>
@@ -4670,7 +4670,7 @@
           <a:p>
             <a:fld id="{3A98EE3D-8CD1-4C3F-BD1C-C98C9596463C}" type="slidenum">
               <a:rPr lang="en-US" smtClean="0"/>
-              <a:t>‹#›</a:t>
+              <a:t>‹Nr.›</a:t>
             </a:fld>
             <a:endParaRPr lang="en-US" dirty="0"/>
           </a:p>
@@ -4926,7 +4926,7 @@
             <a:fld id="{3A98EE3D-8CD1-4C3F-BD1C-C98C9596463C}" type="slidenum">
               <a:rPr lang="en-US" smtClean="0"/>
               <a:pPr/>
-              <a:t>‹#›</a:t>
+              <a:t>‹Nr.›</a:t>
             </a:fld>
             <a:endParaRPr lang="en-US" dirty="0"/>
           </a:p>
@@ -5233,7 +5233,7 @@
           <a:p>
             <a:fld id="{3A98EE3D-8CD1-4C3F-BD1C-C98C9596463C}" type="slidenum">
               <a:rPr lang="en-US" smtClean="0"/>
-              <a:t>‹#›</a:t>
+              <a:t>‹Nr.›</a:t>
             </a:fld>
             <a:endParaRPr lang="en-US" dirty="0"/>
           </a:p>
@@ -5517,7 +5517,7 @@
           <a:p>
             <a:fld id="{3A98EE3D-8CD1-4C3F-BD1C-C98C9596463C}" type="slidenum">
               <a:rPr lang="en-US" smtClean="0"/>
-              <a:t>‹#›</a:t>
+              <a:t>‹Nr.›</a:t>
             </a:fld>
             <a:endParaRPr lang="en-US" dirty="0"/>
           </a:p>
@@ -6343,7 +6343,7 @@
           </a:effectLst>
           <a:extLst>
             <a:ext uri="{91240B29-F687-4f45-9708-019B960494DF}">
-              <a14:hiddenLine xmlns="" xmlns:a14="http://schemas.microsoft.com/office/drawing/2010/main" xmlns:p14="http://schemas.microsoft.com/office/powerpoint/2010/main" xmlns:a16="http://schemas.microsoft.com/office/drawing/2014/main" w="9525">
+              <a14:hiddenLine xmlns:a16="http://schemas.microsoft.com/office/drawing/2014/main" xmlns:p14="http://schemas.microsoft.com/office/powerpoint/2010/main" xmlns:a14="http://schemas.microsoft.com/office/drawing/2010/main" xmlns="" w="9525">
                 <a:solidFill>
                   <a:srgbClr val="000000"/>
                 </a:solidFill>
@@ -7049,17 +7049,23 @@
             </a:r>
           </a:p>
           <a:p>
+            <a:pPr lvl="1"/>
             <a:r>
               <a:rPr lang="en-GB" dirty="0"/>
-              <a:t>Node resolution: ask tree/</a:t>
-            </a:r>
-            <a:r>
-              <a:rPr lang="en-GB" dirty="0" err="1"/>
-              <a:t>buffermanager</a:t>
-            </a:r>
+              <a:t>Shift entry of over-full node to right neighbour</a:t>
+            </a:r>
+          </a:p>
+          <a:p>
+            <a:pPr lvl="1"/>
             <a:r>
               <a:rPr lang="en-GB" dirty="0"/>
-              <a:t> for node with given ID</a:t>
+              <a:t>Or cascading node-splitting to the top</a:t>
+            </a:r>
+          </a:p>
+          <a:p>
+            <a:r>
+              <a:rPr lang="en-GB" dirty="0"/>
+              <a:t>Node resolution: ask tree/buffer manager for node with given ID</a:t>
             </a:r>
           </a:p>
           <a:p>
@@ -8081,15 +8087,6 @@
 </file>
 
 <file path=customXml/item1.xml><?xml version="1.0" encoding="utf-8"?>
-<?mso-contentType ?>
-<FormTemplates xmlns="http://schemas.microsoft.com/sharepoint/v3/contenttype/forms">
-  <Display>DocumentLibraryForm</Display>
-  <Edit>DocumentLibraryForm</Edit>
-  <New>DocumentLibraryForm</New>
-</FormTemplates>
-</file>
-
-<file path=customXml/item2.xml><?xml version="1.0" encoding="utf-8"?>
 <ct:contentTypeSchema xmlns:ct="http://schemas.microsoft.com/office/2006/metadata/contentType" xmlns:ma="http://schemas.microsoft.com/office/2006/metadata/properties/metaAttributes" ct:_="" ma:_="" ma:contentTypeName="Document" ma:contentTypeID="0x01010079F111ED35F8CC479449609E8A0923A6" ma:contentTypeVersion="12" ma:contentTypeDescription="Create a new document." ma:contentTypeScope="" ma:versionID="a410dd7f93c95333ffa1b60ed6adedd1">
   <xsd:schema xmlns:xsd="http://www.w3.org/2001/XMLSchema" xmlns:xs="http://www.w3.org/2001/XMLSchema" xmlns:p="http://schemas.microsoft.com/office/2006/metadata/properties" xmlns:ns2="71af3243-3dd4-4a8d-8c0d-dd76da1f02a5" xmlns:ns3="16c05727-aa75-4e4a-9b5f-8a80a1165891" targetNamespace="http://schemas.microsoft.com/office/2006/metadata/properties" ma:root="true" ma:fieldsID="a936d9baba76aa3866493feff160faab" ns2:_="" ns3:_="">
     <xsd:import namespace="71af3243-3dd4-4a8d-8c0d-dd76da1f02a5"/>
@@ -8310,6 +8307,15 @@
 </ct:contentTypeSchema>
 </file>
 
+<file path=customXml/item2.xml><?xml version="1.0" encoding="utf-8"?>
+<?mso-contentType ?>
+<FormTemplates xmlns="http://schemas.microsoft.com/sharepoint/v3/contenttype/forms">
+  <Display>DocumentLibraryForm</Display>
+  <Edit>DocumentLibraryForm</Edit>
+  <New>DocumentLibraryForm</New>
+</FormTemplates>
+</file>
+
 <file path=customXml/item3.xml><?xml version="1.0" encoding="utf-8"?>
 <p:properties xmlns:p="http://schemas.microsoft.com/office/2006/metadata/properties" xmlns:xsi="http://www.w3.org/2001/XMLSchema-instance" xmlns:pc="http://schemas.microsoft.com/office/infopath/2007/PartnerControls">
   <documentManagement>
@@ -8320,14 +8326,6 @@
 </file>
 
 <file path=customXml/itemProps1.xml><?xml version="1.0" encoding="utf-8"?>
-<ds:datastoreItem xmlns:ds="http://schemas.openxmlformats.org/officeDocument/2006/customXml" ds:itemID="{64B270AB-C138-415C-897E-3C24487DECF1}">
-  <ds:schemaRefs>
-    <ds:schemaRef ds:uri="http://schemas.microsoft.com/sharepoint/v3/contenttype/forms"/>
-  </ds:schemaRefs>
-</ds:datastoreItem>
-</file>
-
-<file path=customXml/itemProps2.xml><?xml version="1.0" encoding="utf-8"?>
 <ds:datastoreItem xmlns:ds="http://schemas.openxmlformats.org/officeDocument/2006/customXml" ds:itemID="{0585E981-8C91-4205-A0C3-C991F42B4C9E}">
   <ds:schemaRefs>
     <ds:schemaRef ds:uri="http://schemas.microsoft.com/office/2006/metadata/contentType"/>
@@ -8346,6 +8344,14 @@
 </ds:datastoreItem>
 </file>
 
+<file path=customXml/itemProps2.xml><?xml version="1.0" encoding="utf-8"?>
+<ds:datastoreItem xmlns:ds="http://schemas.openxmlformats.org/officeDocument/2006/customXml" ds:itemID="{64B270AB-C138-415C-897E-3C24487DECF1}">
+  <ds:schemaRefs>
+    <ds:schemaRef ds:uri="http://schemas.microsoft.com/sharepoint/v3/contenttype/forms"/>
+  </ds:schemaRefs>
+</ds:datastoreItem>
+</file>
+
 <file path=customXml/itemProps3.xml><?xml version="1.0" encoding="utf-8"?>
 <ds:datastoreItem xmlns:ds="http://schemas.openxmlformats.org/officeDocument/2006/customXml" ds:itemID="{2C4C00F4-06E9-43E3-AD97-88A857CEFA82}">
   <ds:schemaRefs>

</xml_diff>